<commit_message>
week 4 Thursday lab
</commit_message>
<xml_diff>
--- a/Week4/Week4session1.pptx
+++ b/Week4/Week4session1.pptx
@@ -245,7 +245,7 @@
           <a:p>
             <a:fld id="{0AC85C83-8E60-4A87-A094-C983E1BBD67C}" type="datetimeFigureOut">
               <a:rPr lang="en-US" smtClean="0"/>
-              <a:t>4/25/2017</a:t>
+              <a:t>4/27/17</a:t>
             </a:fld>
             <a:endParaRPr lang="en-US" dirty="0"/>
           </a:p>
@@ -728,7 +728,7 @@
           <a:p>
             <a:fld id="{6634F801-C165-4294-8085-9D9FB6EA6872}" type="datetimeFigureOut">
               <a:rPr lang="en-US" smtClean="0"/>
-              <a:t>4/25/2017</a:t>
+              <a:t>4/27/17</a:t>
             </a:fld>
             <a:endParaRPr lang="en-US" dirty="0"/>
           </a:p>
@@ -898,7 +898,7 @@
           <a:p>
             <a:fld id="{6634F801-C165-4294-8085-9D9FB6EA6872}" type="datetimeFigureOut">
               <a:rPr lang="en-US" smtClean="0"/>
-              <a:t>4/25/2017</a:t>
+              <a:t>4/27/17</a:t>
             </a:fld>
             <a:endParaRPr lang="en-US" dirty="0"/>
           </a:p>
@@ -1078,7 +1078,7 @@
           <a:p>
             <a:fld id="{6634F801-C165-4294-8085-9D9FB6EA6872}" type="datetimeFigureOut">
               <a:rPr lang="en-US" smtClean="0"/>
-              <a:t>4/25/2017</a:t>
+              <a:t>4/27/17</a:t>
             </a:fld>
             <a:endParaRPr lang="en-US" dirty="0"/>
           </a:p>
@@ -1248,7 +1248,7 @@
           <a:p>
             <a:fld id="{6634F801-C165-4294-8085-9D9FB6EA6872}" type="datetimeFigureOut">
               <a:rPr lang="en-US" smtClean="0"/>
-              <a:t>4/25/2017</a:t>
+              <a:t>4/27/17</a:t>
             </a:fld>
             <a:endParaRPr lang="en-US" dirty="0"/>
           </a:p>
@@ -1494,7 +1494,7 @@
           <a:p>
             <a:fld id="{6634F801-C165-4294-8085-9D9FB6EA6872}" type="datetimeFigureOut">
               <a:rPr lang="en-US" smtClean="0"/>
-              <a:t>4/25/2017</a:t>
+              <a:t>4/27/17</a:t>
             </a:fld>
             <a:endParaRPr lang="en-US" dirty="0"/>
           </a:p>
@@ -1726,7 +1726,7 @@
           <a:p>
             <a:fld id="{6634F801-C165-4294-8085-9D9FB6EA6872}" type="datetimeFigureOut">
               <a:rPr lang="en-US" smtClean="0"/>
-              <a:t>4/25/2017</a:t>
+              <a:t>4/27/17</a:t>
             </a:fld>
             <a:endParaRPr lang="en-US" dirty="0"/>
           </a:p>
@@ -2093,7 +2093,7 @@
           <a:p>
             <a:fld id="{6634F801-C165-4294-8085-9D9FB6EA6872}" type="datetimeFigureOut">
               <a:rPr lang="en-US" smtClean="0"/>
-              <a:t>4/25/2017</a:t>
+              <a:t>4/27/17</a:t>
             </a:fld>
             <a:endParaRPr lang="en-US" dirty="0"/>
           </a:p>
@@ -2211,7 +2211,7 @@
           <a:p>
             <a:fld id="{6634F801-C165-4294-8085-9D9FB6EA6872}" type="datetimeFigureOut">
               <a:rPr lang="en-US" smtClean="0"/>
-              <a:t>4/25/2017</a:t>
+              <a:t>4/27/17</a:t>
             </a:fld>
             <a:endParaRPr lang="en-US" dirty="0"/>
           </a:p>
@@ -2306,7 +2306,7 @@
           <a:p>
             <a:fld id="{6634F801-C165-4294-8085-9D9FB6EA6872}" type="datetimeFigureOut">
               <a:rPr lang="en-US" smtClean="0"/>
-              <a:t>4/25/2017</a:t>
+              <a:t>4/27/17</a:t>
             </a:fld>
             <a:endParaRPr lang="en-US" dirty="0"/>
           </a:p>
@@ -2583,7 +2583,7 @@
           <a:p>
             <a:fld id="{6634F801-C165-4294-8085-9D9FB6EA6872}" type="datetimeFigureOut">
               <a:rPr lang="en-US" smtClean="0"/>
-              <a:t>4/25/2017</a:t>
+              <a:t>4/27/17</a:t>
             </a:fld>
             <a:endParaRPr lang="en-US" dirty="0"/>
           </a:p>
@@ -2836,7 +2836,7 @@
           <a:p>
             <a:fld id="{6634F801-C165-4294-8085-9D9FB6EA6872}" type="datetimeFigureOut">
               <a:rPr lang="en-US" smtClean="0"/>
-              <a:t>4/25/2017</a:t>
+              <a:t>4/27/17</a:t>
             </a:fld>
             <a:endParaRPr lang="en-US" dirty="0"/>
           </a:p>
@@ -3049,7 +3049,7 @@
           <a:p>
             <a:fld id="{6634F801-C165-4294-8085-9D9FB6EA6872}" type="datetimeFigureOut">
               <a:rPr lang="en-US" smtClean="0"/>
-              <a:t>4/25/2017</a:t>
+              <a:t>4/27/17</a:t>
             </a:fld>
             <a:endParaRPr lang="en-US" dirty="0"/>
           </a:p>
@@ -3997,11 +3997,7 @@
             </a:r>
             <a:r>
               <a:rPr lang="en-US" sz="1800" dirty="0" smtClean="0"/>
-              <a:t>&gt;</a:t>
-            </a:r>
-            <a:r>
-              <a:rPr lang="en-US" sz="1800" dirty="0" smtClean="0"/>
-              <a:t> </a:t>
+              <a:t>&gt; </a:t>
             </a:r>
             <a:r>
               <a:rPr lang="en-US" sz="1800" b="1" dirty="0">
@@ -4062,11 +4058,7 @@
             </a:r>
             <a:r>
               <a:rPr lang="en-US" sz="1800" dirty="0"/>
-              <a:t> </a:t>
-            </a:r>
-            <a:r>
-              <a:rPr lang="en-US" sz="1800" dirty="0"/>
-              <a:t>&lt;</a:t>
+              <a:t> &lt;</a:t>
             </a:r>
             <a:r>
               <a:rPr lang="en-US" sz="1800" dirty="0" err="1"/>
@@ -4090,11 +4082,7 @@
             </a:r>
             <a:r>
               <a:rPr lang="en-US" sz="1800" dirty="0"/>
-              <a:t> </a:t>
-            </a:r>
-            <a:r>
-              <a:rPr lang="en-US" sz="1800" dirty="0"/>
-              <a:t>&lt;</a:t>
+              <a:t> &lt;</a:t>
             </a:r>
             <a:r>
               <a:rPr lang="en-US" sz="1800" dirty="0" err="1"/>
@@ -5712,11 +5700,7 @@
             </a:pPr>
             <a:r>
               <a:rPr lang="en-US" sz="2400" dirty="0" smtClean="0"/>
-              <a:t>See </a:t>
-            </a:r>
-            <a:r>
-              <a:rPr lang="en-US" sz="2400" dirty="0" smtClean="0"/>
-              <a:t>information about a table structure or query execution plans. Commands </a:t>
+              <a:t>See information about a table structure or query execution plans. Commands </a:t>
             </a:r>
             <a:r>
               <a:rPr lang="en-US" sz="2400" b="1" dirty="0" smtClean="0"/>
@@ -5791,11 +5775,7 @@
             </a:r>
             <a:r>
               <a:rPr lang="en-US" sz="2000" dirty="0" smtClean="0"/>
-              <a:t>genomes</a:t>
-            </a:r>
-            <a:r>
-              <a:rPr lang="en-US" sz="2000" dirty="0" smtClean="0"/>
-              <a:t>;</a:t>
+              <a:t>genomes;</a:t>
             </a:r>
           </a:p>
           <a:p>
@@ -10132,15 +10112,7 @@
             </a:pPr>
             <a:r>
               <a:rPr lang="en-US" sz="2400" dirty="0" smtClean="0"/>
-              <a:t>Command line interface to load tables </a:t>
-            </a:r>
-            <a:r>
-              <a:rPr lang="en-US" sz="2400" dirty="0" smtClean="0"/>
-              <a:t>from </a:t>
-            </a:r>
-            <a:r>
-              <a:rPr lang="en-US" sz="2400" dirty="0" smtClean="0"/>
-              <a:t>a file (</a:t>
+              <a:t>Command line interface to load tables from a file (</a:t>
             </a:r>
             <a:r>
               <a:rPr lang="en-US" sz="2400" b="1" dirty="0" err="1" smtClean="0"/>
@@ -11471,11 +11443,7 @@
             </a:r>
             <a:r>
               <a:rPr lang="en-US" sz="1800" dirty="0" smtClean="0"/>
-              <a:t> (to replace </a:t>
-            </a:r>
-            <a:r>
-              <a:rPr lang="en-US" sz="1800" dirty="0" smtClean="0"/>
-              <a:t>many </a:t>
+              <a:t> (to replace many </a:t>
             </a:r>
             <a:r>
               <a:rPr lang="en-US" sz="1800" b="1" dirty="0" smtClean="0"/>
@@ -12535,15 +12503,7 @@
             </a:pPr>
             <a:r>
               <a:rPr lang="en-US" sz="2200" dirty="0" smtClean="0"/>
-              <a:t>The syntax of the regular expressions is </a:t>
-            </a:r>
-            <a:r>
-              <a:rPr lang="en-US" sz="2200" dirty="0" smtClean="0"/>
-              <a:t>similar </a:t>
-            </a:r>
-            <a:r>
-              <a:rPr lang="en-US" sz="2200" dirty="0" smtClean="0"/>
-              <a:t>to those used in bash and python, but there are differences (check the documentation). For example, to make a pattern match case sensitive we need to add the </a:t>
+              <a:t>The syntax of the regular expressions is similar to those used in bash and python, but there are differences (check the documentation). For example, to make a pattern match case sensitive we need to add the </a:t>
             </a:r>
             <a:r>
               <a:rPr lang="en-US" sz="2200" b="1" dirty="0" smtClean="0"/>
@@ -13764,15 +13724,7 @@
             </a:pPr>
             <a:r>
               <a:rPr lang="en-US" sz="2000" dirty="0" smtClean="0"/>
-              <a:t>Count the </a:t>
-            </a:r>
-            <a:r>
-              <a:rPr lang="en-US" sz="2000" dirty="0" smtClean="0"/>
-              <a:t>number </a:t>
-            </a:r>
-            <a:r>
-              <a:rPr lang="en-US" sz="2000" dirty="0" smtClean="0"/>
-              <a:t>of rows returned by a query: </a:t>
+              <a:t>Count the number of rows returned by a query: </a:t>
             </a:r>
           </a:p>
           <a:p>
@@ -17876,11 +17828,7 @@
             </a:r>
             <a:r>
               <a:rPr lang="en-US" sz="1300" dirty="0" smtClean="0"/>
-              <a:t> </a:t>
-            </a:r>
-            <a:r>
-              <a:rPr lang="en-US" sz="1300" dirty="0" smtClean="0"/>
-              <a:t>bm185s_db </a:t>
+              <a:t> bm185s_db </a:t>
             </a:r>
             <a:r>
               <a:rPr lang="en-US" sz="1300" b="1" dirty="0" smtClean="0">
@@ -18701,7 +18649,6 @@
               <a:rPr lang="en-US" sz="2000" dirty="0" smtClean="0"/>
               <a:t>For testing purposes you may want to create a temporary table based on the structure of an existing table with a limited set of rows:</a:t>
             </a:r>
-            <a:endParaRPr lang="en-US" sz="2000" dirty="0" smtClean="0"/>
           </a:p>
           <a:p>
             <a:pPr lvl="1">
@@ -18772,7 +18719,6 @@
               <a:rPr lang="en-US" sz="2000" dirty="0" smtClean="0"/>
               <a:t> 100;</a:t>
             </a:r>
-            <a:endParaRPr lang="en-US" sz="2000" dirty="0" smtClean="0"/>
           </a:p>
           <a:p>
             <a:pPr marL="463550" indent="-463550">
@@ -19988,7 +19934,6 @@
               <a:rPr lang="en-US" sz="2200" dirty="0" smtClean="0"/>
               <a:t>Create a replicons table:</a:t>
             </a:r>
-            <a:endParaRPr lang="en-US" sz="2200" dirty="0" smtClean="0"/>
           </a:p>
           <a:p>
             <a:pPr marL="457200" lvl="1" indent="0">
@@ -20018,19 +19963,8 @@
                 <a:latin typeface="Courier New" panose="02070309020205020404" pitchFamily="49" charset="0"/>
                 <a:cs typeface="Courier New" panose="02070309020205020404" pitchFamily="49" charset="0"/>
               </a:rPr>
-              <a:t> </a:t>
-            </a:r>
-            <a:r>
-              <a:rPr lang="en-US" sz="1800" dirty="0" smtClean="0">
-                <a:latin typeface="Courier New" panose="02070309020205020404" pitchFamily="49" charset="0"/>
-                <a:cs typeface="Courier New" panose="02070309020205020404" pitchFamily="49" charset="0"/>
-              </a:rPr>
-              <a:t>replicons(</a:t>
-            </a:r>
-            <a:endParaRPr lang="en-US" sz="1800" dirty="0" smtClean="0">
-              <a:latin typeface="Courier New" panose="02070309020205020404" pitchFamily="49" charset="0"/>
-              <a:cs typeface="Courier New" panose="02070309020205020404" pitchFamily="49" charset="0"/>
-            </a:endParaRPr>
+              <a:t> replicons(</a:t>
+            </a:r>
           </a:p>
           <a:p>
             <a:pPr marL="914400" lvl="2" indent="0">
@@ -20086,6 +20020,70 @@
                 <a:latin typeface="Courier New" panose="02070309020205020404" pitchFamily="49" charset="0"/>
                 <a:cs typeface="Courier New" panose="02070309020205020404" pitchFamily="49" charset="0"/>
               </a:rPr>
+              <a:t>UNSIGNED NOT NULL,</a:t>
+            </a:r>
+          </a:p>
+          <a:p>
+            <a:pPr marL="914400" lvl="2" indent="0">
+              <a:buClr>
+                <a:srgbClr val="002060"/>
+              </a:buClr>
+              <a:buNone/>
+            </a:pPr>
+            <a:r>
+              <a:rPr lang="en-US" sz="1800" b="1" dirty="0">
+                <a:latin typeface="Courier New" panose="02070309020205020404" pitchFamily="49" charset="0"/>
+                <a:cs typeface="Courier New" panose="02070309020205020404" pitchFamily="49" charset="0"/>
+              </a:rPr>
+              <a:t> </a:t>
+            </a:r>
+            <a:r>
+              <a:rPr lang="en-US" sz="1800" b="1" dirty="0" smtClean="0">
+                <a:latin typeface="Courier New" panose="02070309020205020404" pitchFamily="49" charset="0"/>
+                <a:cs typeface="Courier New" panose="02070309020205020404" pitchFamily="49" charset="0"/>
+              </a:rPr>
+              <a:t> </a:t>
+            </a:r>
+            <a:r>
+              <a:rPr lang="en-US" sz="1800" dirty="0" err="1" smtClean="0">
+                <a:latin typeface="Courier New" panose="02070309020205020404" pitchFamily="49" charset="0"/>
+                <a:cs typeface="Courier New" panose="02070309020205020404" pitchFamily="49" charset="0"/>
+              </a:rPr>
+              <a:t>genome_id</a:t>
+            </a:r>
+            <a:r>
+              <a:rPr lang="en-US" sz="1800" dirty="0" smtClean="0">
+                <a:latin typeface="Courier New" panose="02070309020205020404" pitchFamily="49" charset="0"/>
+                <a:cs typeface="Courier New" panose="02070309020205020404" pitchFamily="49" charset="0"/>
+              </a:rPr>
+              <a:t>    </a:t>
+            </a:r>
+            <a:r>
+              <a:rPr lang="en-US" sz="1800" b="1" dirty="0" smtClean="0">
+                <a:latin typeface="Courier New" panose="02070309020205020404" pitchFamily="49" charset="0"/>
+                <a:cs typeface="Courier New" panose="02070309020205020404" pitchFamily="49" charset="0"/>
+              </a:rPr>
+              <a:t>INT</a:t>
+            </a:r>
+            <a:r>
+              <a:rPr lang="en-US" sz="1800" dirty="0" smtClean="0">
+                <a:latin typeface="Courier New" panose="02070309020205020404" pitchFamily="49" charset="0"/>
+                <a:cs typeface="Courier New" panose="02070309020205020404" pitchFamily="49" charset="0"/>
+              </a:rPr>
+              <a:t>      </a:t>
+            </a:r>
+            <a:r>
+              <a:rPr lang="en-US" sz="1800" dirty="0">
+                <a:latin typeface="Courier New" panose="02070309020205020404" pitchFamily="49" charset="0"/>
+                <a:cs typeface="Courier New" panose="02070309020205020404" pitchFamily="49" charset="0"/>
+              </a:rPr>
+              <a:t>(10) </a:t>
+            </a:r>
+            <a:r>
+              <a:rPr lang="en-US" sz="1800" b="1" dirty="0">
+                <a:latin typeface="Courier New" panose="02070309020205020404" pitchFamily="49" charset="0"/>
+                <a:cs typeface="Courier New" panose="02070309020205020404" pitchFamily="49" charset="0"/>
+              </a:rPr>
               <a:t>UNSIGNED NOT </a:t>
             </a:r>
             <a:r>
@@ -20095,6 +20093,103 @@
               </a:rPr>
               <a:t>NULL,</a:t>
             </a:r>
+            <a:endParaRPr lang="en-US" sz="1800" b="1" dirty="0">
+              <a:latin typeface="Courier New" panose="02070309020205020404" pitchFamily="49" charset="0"/>
+              <a:cs typeface="Courier New" panose="02070309020205020404" pitchFamily="49" charset="0"/>
+            </a:endParaRPr>
+          </a:p>
+          <a:p>
+            <a:pPr marL="914400" lvl="2" indent="0">
+              <a:buClr>
+                <a:srgbClr val="002060"/>
+              </a:buClr>
+              <a:buNone/>
+            </a:pPr>
+            <a:r>
+              <a:rPr lang="en-US" sz="1800" dirty="0" smtClean="0">
+                <a:latin typeface="Courier New" panose="02070309020205020404" pitchFamily="49" charset="0"/>
+                <a:cs typeface="Courier New" panose="02070309020205020404" pitchFamily="49" charset="0"/>
+              </a:rPr>
+              <a:t>  name         </a:t>
+            </a:r>
+            <a:r>
+              <a:rPr lang="en-US" sz="1800" b="1" dirty="0" smtClean="0">
+                <a:latin typeface="Courier New" panose="02070309020205020404" pitchFamily="49" charset="0"/>
+                <a:cs typeface="Courier New" panose="02070309020205020404" pitchFamily="49" charset="0"/>
+              </a:rPr>
+              <a:t>VARCHAR</a:t>
+            </a:r>
+            <a:r>
+              <a:rPr lang="en-US" sz="1800" dirty="0" smtClean="0">
+                <a:latin typeface="Courier New" panose="02070309020205020404" pitchFamily="49" charset="0"/>
+                <a:cs typeface="Courier New" panose="02070309020205020404" pitchFamily="49" charset="0"/>
+              </a:rPr>
+              <a:t> (100) </a:t>
+            </a:r>
+            <a:r>
+              <a:rPr lang="en-US" sz="1800" b="1" dirty="0" smtClean="0">
+                <a:latin typeface="Courier New" panose="02070309020205020404" pitchFamily="49" charset="0"/>
+                <a:cs typeface="Courier New" panose="02070309020205020404" pitchFamily="49" charset="0"/>
+              </a:rPr>
+              <a:t>NOT NULL</a:t>
+            </a:r>
+            <a:r>
+              <a:rPr lang="en-US" sz="1800" dirty="0" smtClean="0">
+                <a:latin typeface="Courier New" panose="02070309020205020404" pitchFamily="49" charset="0"/>
+                <a:cs typeface="Courier New" panose="02070309020205020404" pitchFamily="49" charset="0"/>
+              </a:rPr>
+              <a:t>,</a:t>
+            </a:r>
+          </a:p>
+          <a:p>
+            <a:pPr marL="914400" lvl="2" indent="0">
+              <a:buClr>
+                <a:srgbClr val="002060"/>
+              </a:buClr>
+              <a:buNone/>
+            </a:pPr>
+            <a:r>
+              <a:rPr lang="en-US" sz="1800" dirty="0" smtClean="0">
+                <a:latin typeface="Courier New" panose="02070309020205020404" pitchFamily="49" charset="0"/>
+                <a:cs typeface="Courier New" panose="02070309020205020404" pitchFamily="49" charset="0"/>
+              </a:rPr>
+              <a:t>  </a:t>
+            </a:r>
+            <a:r>
+              <a:rPr lang="en-US" sz="1800" dirty="0" err="1" smtClean="0">
+                <a:latin typeface="Courier New" panose="02070309020205020404" pitchFamily="49" charset="0"/>
+                <a:cs typeface="Courier New" panose="02070309020205020404" pitchFamily="49" charset="0"/>
+              </a:rPr>
+              <a:t>num_genes</a:t>
+            </a:r>
+            <a:r>
+              <a:rPr lang="en-US" sz="1800" dirty="0" smtClean="0">
+                <a:latin typeface="Courier New" panose="02070309020205020404" pitchFamily="49" charset="0"/>
+                <a:cs typeface="Courier New" panose="02070309020205020404" pitchFamily="49" charset="0"/>
+              </a:rPr>
+              <a:t>    </a:t>
+            </a:r>
+            <a:r>
+              <a:rPr lang="en-US" sz="1800" b="1" dirty="0" smtClean="0">
+                <a:latin typeface="Courier New" panose="02070309020205020404" pitchFamily="49" charset="0"/>
+                <a:cs typeface="Courier New" panose="02070309020205020404" pitchFamily="49" charset="0"/>
+              </a:rPr>
+              <a:t>INT</a:t>
+            </a:r>
+            <a:r>
+              <a:rPr lang="en-US" sz="1800" dirty="0" smtClean="0">
+                <a:latin typeface="Courier New" panose="02070309020205020404" pitchFamily="49" charset="0"/>
+                <a:cs typeface="Courier New" panose="02070309020205020404" pitchFamily="49" charset="0"/>
+              </a:rPr>
+              <a:t>      (10) </a:t>
+            </a:r>
+            <a:r>
+              <a:rPr lang="en-US" sz="1800" b="1" dirty="0" smtClean="0">
+                <a:latin typeface="Courier New" panose="02070309020205020404" pitchFamily="49" charset="0"/>
+                <a:cs typeface="Courier New" panose="02070309020205020404" pitchFamily="49" charset="0"/>
+              </a:rPr>
+              <a:t>UNSIGNED NOT NULL,</a:t>
+            </a:r>
           </a:p>
           <a:p>
             <a:pPr marL="914400" lvl="2" indent="0">
@@ -20122,14 +20217,14 @@
                 <a:latin typeface="Courier New" panose="02070309020205020404" pitchFamily="49" charset="0"/>
                 <a:cs typeface="Courier New" panose="02070309020205020404" pitchFamily="49" charset="0"/>
               </a:rPr>
-              <a:t>genome_id</a:t>
+              <a:t>rep_size</a:t>
             </a:r>
             <a:r>
               <a:rPr lang="en-US" sz="1800" dirty="0" smtClean="0">
                 <a:latin typeface="Courier New" panose="02070309020205020404" pitchFamily="49" charset="0"/>
                 <a:cs typeface="Courier New" panose="02070309020205020404" pitchFamily="49" charset="0"/>
               </a:rPr>
-              <a:t>    </a:t>
+              <a:t>     </a:t>
             </a:r>
             <a:r>
               <a:rPr lang="en-US" sz="1800" b="1" dirty="0" smtClean="0">
@@ -20157,54 +20252,62 @@
                 <a:latin typeface="Courier New" panose="02070309020205020404" pitchFamily="49" charset="0"/>
                 <a:cs typeface="Courier New" panose="02070309020205020404" pitchFamily="49" charset="0"/>
               </a:rPr>
-              <a:t>UNSIGNED NOT </a:t>
-            </a:r>
+              <a:t>UNSIGNED NOT NULL,</a:t>
+            </a:r>
+            <a:endParaRPr lang="en-US" sz="1800" b="1" dirty="0" smtClean="0">
+              <a:latin typeface="Courier New" panose="02070309020205020404" pitchFamily="49" charset="0"/>
+              <a:cs typeface="Courier New" panose="02070309020205020404" pitchFamily="49" charset="0"/>
+            </a:endParaRPr>
+          </a:p>
+          <a:p>
+            <a:pPr marL="914400" lvl="2" indent="0">
+              <a:buClr>
+                <a:srgbClr val="002060"/>
+              </a:buClr>
+              <a:buNone/>
+            </a:pPr>
             <a:r>
               <a:rPr lang="en-US" sz="1800" b="1" dirty="0" smtClean="0">
                 <a:latin typeface="Courier New" panose="02070309020205020404" pitchFamily="49" charset="0"/>
                 <a:cs typeface="Courier New" panose="02070309020205020404" pitchFamily="49" charset="0"/>
               </a:rPr>
-              <a:t>NULL,</a:t>
-            </a:r>
-            <a:endParaRPr lang="en-US" sz="1800" b="1" dirty="0">
-              <a:latin typeface="Courier New" panose="02070309020205020404" pitchFamily="49" charset="0"/>
-              <a:cs typeface="Courier New" panose="02070309020205020404" pitchFamily="49" charset="0"/>
-            </a:endParaRPr>
-          </a:p>
-          <a:p>
-            <a:pPr marL="914400" lvl="2" indent="0">
-              <a:buClr>
-                <a:srgbClr val="002060"/>
-              </a:buClr>
-              <a:buNone/>
-            </a:pPr>
+              <a:t>  PRIMARY KEY </a:t>
+            </a:r>
             <a:r>
               <a:rPr lang="en-US" sz="1800" dirty="0" smtClean="0">
                 <a:latin typeface="Courier New" panose="02070309020205020404" pitchFamily="49" charset="0"/>
                 <a:cs typeface="Courier New" panose="02070309020205020404" pitchFamily="49" charset="0"/>
               </a:rPr>
-              <a:t>  </a:t>
+              <a:t>(</a:t>
+            </a:r>
+            <a:r>
+              <a:rPr lang="en-US" sz="1800" dirty="0" err="1" smtClean="0">
+                <a:latin typeface="Courier New" panose="02070309020205020404" pitchFamily="49" charset="0"/>
+                <a:cs typeface="Courier New" panose="02070309020205020404" pitchFamily="49" charset="0"/>
+              </a:rPr>
+              <a:t>replicon_id</a:t>
             </a:r>
             <a:r>
               <a:rPr lang="en-US" sz="1800" dirty="0" smtClean="0">
                 <a:latin typeface="Courier New" panose="02070309020205020404" pitchFamily="49" charset="0"/>
                 <a:cs typeface="Courier New" panose="02070309020205020404" pitchFamily="49" charset="0"/>
               </a:rPr>
-              <a:t>name       </a:t>
-            </a:r>
-            <a:r>
-              <a:rPr lang="en-US" sz="1800" dirty="0" smtClean="0">
+              <a:t>),</a:t>
+            </a:r>
+          </a:p>
+          <a:p>
+            <a:pPr marL="914400" lvl="2" indent="0">
+              <a:buClr>
+                <a:srgbClr val="002060"/>
+              </a:buClr>
+              <a:buNone/>
+            </a:pPr>
+            <a:r>
+              <a:rPr lang="en-US" sz="1800" dirty="0">
                 <a:latin typeface="Courier New" panose="02070309020205020404" pitchFamily="49" charset="0"/>
                 <a:cs typeface="Courier New" panose="02070309020205020404" pitchFamily="49" charset="0"/>
               </a:rPr>
-              <a:t>  </a:t>
-            </a:r>
-            <a:r>
-              <a:rPr lang="en-US" sz="1800" b="1" dirty="0" smtClean="0">
-                <a:latin typeface="Courier New" panose="02070309020205020404" pitchFamily="49" charset="0"/>
-                <a:cs typeface="Courier New" panose="02070309020205020404" pitchFamily="49" charset="0"/>
-              </a:rPr>
-              <a:t>VARCHAR</a:t>
+              <a:t> </a:t>
             </a:r>
             <a:r>
               <a:rPr lang="en-US" sz="1800" dirty="0" smtClean="0">
@@ -20214,231 +20317,6 @@
               <a:t> </a:t>
             </a:r>
             <a:r>
-              <a:rPr lang="en-US" sz="1800" dirty="0" smtClean="0">
-                <a:latin typeface="Courier New" panose="02070309020205020404" pitchFamily="49" charset="0"/>
-                <a:cs typeface="Courier New" panose="02070309020205020404" pitchFamily="49" charset="0"/>
-              </a:rPr>
-              <a:t>(100) </a:t>
-            </a:r>
-            <a:r>
-              <a:rPr lang="en-US" sz="1800" b="1" dirty="0" smtClean="0">
-                <a:latin typeface="Courier New" panose="02070309020205020404" pitchFamily="49" charset="0"/>
-                <a:cs typeface="Courier New" panose="02070309020205020404" pitchFamily="49" charset="0"/>
-              </a:rPr>
-              <a:t>NOT NULL</a:t>
-            </a:r>
-            <a:r>
-              <a:rPr lang="en-US" sz="1800" dirty="0" smtClean="0">
-                <a:latin typeface="Courier New" panose="02070309020205020404" pitchFamily="49" charset="0"/>
-                <a:cs typeface="Courier New" panose="02070309020205020404" pitchFamily="49" charset="0"/>
-              </a:rPr>
-              <a:t>,</a:t>
-            </a:r>
-          </a:p>
-          <a:p>
-            <a:pPr marL="914400" lvl="2" indent="0">
-              <a:buClr>
-                <a:srgbClr val="002060"/>
-              </a:buClr>
-              <a:buNone/>
-            </a:pPr>
-            <a:r>
-              <a:rPr lang="en-US" sz="1800" dirty="0" smtClean="0">
-                <a:latin typeface="Courier New" panose="02070309020205020404" pitchFamily="49" charset="0"/>
-                <a:cs typeface="Courier New" panose="02070309020205020404" pitchFamily="49" charset="0"/>
-              </a:rPr>
-              <a:t>  </a:t>
-            </a:r>
-            <a:r>
-              <a:rPr lang="en-US" sz="1800" dirty="0" err="1" smtClean="0">
-                <a:latin typeface="Courier New" panose="02070309020205020404" pitchFamily="49" charset="0"/>
-                <a:cs typeface="Courier New" panose="02070309020205020404" pitchFamily="49" charset="0"/>
-              </a:rPr>
-              <a:t>num_genes</a:t>
-            </a:r>
-            <a:r>
-              <a:rPr lang="en-US" sz="1800" dirty="0" smtClean="0">
-                <a:latin typeface="Courier New" panose="02070309020205020404" pitchFamily="49" charset="0"/>
-                <a:cs typeface="Courier New" panose="02070309020205020404" pitchFamily="49" charset="0"/>
-              </a:rPr>
-              <a:t>    </a:t>
-            </a:r>
-            <a:r>
-              <a:rPr lang="en-US" sz="1800" b="1" dirty="0" smtClean="0">
-                <a:latin typeface="Courier New" panose="02070309020205020404" pitchFamily="49" charset="0"/>
-                <a:cs typeface="Courier New" panose="02070309020205020404" pitchFamily="49" charset="0"/>
-              </a:rPr>
-              <a:t>INT</a:t>
-            </a:r>
-            <a:r>
-              <a:rPr lang="en-US" sz="1800" dirty="0" smtClean="0">
-                <a:latin typeface="Courier New" panose="02070309020205020404" pitchFamily="49" charset="0"/>
-                <a:cs typeface="Courier New" panose="02070309020205020404" pitchFamily="49" charset="0"/>
-              </a:rPr>
-              <a:t>      </a:t>
-            </a:r>
-            <a:r>
-              <a:rPr lang="en-US" sz="1800" dirty="0" smtClean="0">
-                <a:latin typeface="Courier New" panose="02070309020205020404" pitchFamily="49" charset="0"/>
-                <a:cs typeface="Courier New" panose="02070309020205020404" pitchFamily="49" charset="0"/>
-              </a:rPr>
-              <a:t>(10) </a:t>
-            </a:r>
-            <a:r>
-              <a:rPr lang="en-US" sz="1800" b="1" dirty="0" smtClean="0">
-                <a:latin typeface="Courier New" panose="02070309020205020404" pitchFamily="49" charset="0"/>
-                <a:cs typeface="Courier New" panose="02070309020205020404" pitchFamily="49" charset="0"/>
-              </a:rPr>
-              <a:t>UNSIGNED NOT NULL</a:t>
-            </a:r>
-            <a:r>
-              <a:rPr lang="en-US" sz="1800" b="1" dirty="0" smtClean="0">
-                <a:latin typeface="Courier New" panose="02070309020205020404" pitchFamily="49" charset="0"/>
-                <a:cs typeface="Courier New" panose="02070309020205020404" pitchFamily="49" charset="0"/>
-              </a:rPr>
-              <a:t>,</a:t>
-            </a:r>
-          </a:p>
-          <a:p>
-            <a:pPr marL="914400" lvl="2" indent="0">
-              <a:buClr>
-                <a:srgbClr val="002060"/>
-              </a:buClr>
-              <a:buNone/>
-            </a:pPr>
-            <a:r>
-              <a:rPr lang="en-US" sz="1800" b="1" dirty="0">
-                <a:latin typeface="Courier New" panose="02070309020205020404" pitchFamily="49" charset="0"/>
-                <a:cs typeface="Courier New" panose="02070309020205020404" pitchFamily="49" charset="0"/>
-              </a:rPr>
-              <a:t> </a:t>
-            </a:r>
-            <a:r>
-              <a:rPr lang="en-US" sz="1800" b="1" dirty="0" smtClean="0">
-                <a:latin typeface="Courier New" panose="02070309020205020404" pitchFamily="49" charset="0"/>
-                <a:cs typeface="Courier New" panose="02070309020205020404" pitchFamily="49" charset="0"/>
-              </a:rPr>
-              <a:t> </a:t>
-            </a:r>
-            <a:r>
-              <a:rPr lang="en-US" sz="1800" dirty="0" err="1" smtClean="0">
-                <a:latin typeface="Courier New" panose="02070309020205020404" pitchFamily="49" charset="0"/>
-                <a:cs typeface="Courier New" panose="02070309020205020404" pitchFamily="49" charset="0"/>
-              </a:rPr>
-              <a:t>rep_size</a:t>
-            </a:r>
-            <a:r>
-              <a:rPr lang="en-US" sz="1800" dirty="0" smtClean="0">
-                <a:latin typeface="Courier New" panose="02070309020205020404" pitchFamily="49" charset="0"/>
-                <a:cs typeface="Courier New" panose="02070309020205020404" pitchFamily="49" charset="0"/>
-              </a:rPr>
-              <a:t>     </a:t>
-            </a:r>
-            <a:r>
-              <a:rPr lang="en-US" sz="1800" b="1" dirty="0" smtClean="0">
-                <a:latin typeface="Courier New" panose="02070309020205020404" pitchFamily="49" charset="0"/>
-                <a:cs typeface="Courier New" panose="02070309020205020404" pitchFamily="49" charset="0"/>
-              </a:rPr>
-              <a:t>INT</a:t>
-            </a:r>
-            <a:r>
-              <a:rPr lang="en-US" sz="1800" dirty="0" smtClean="0">
-                <a:latin typeface="Courier New" panose="02070309020205020404" pitchFamily="49" charset="0"/>
-                <a:cs typeface="Courier New" panose="02070309020205020404" pitchFamily="49" charset="0"/>
-              </a:rPr>
-              <a:t>      </a:t>
-            </a:r>
-            <a:r>
-              <a:rPr lang="en-US" sz="1800" dirty="0">
-                <a:latin typeface="Courier New" panose="02070309020205020404" pitchFamily="49" charset="0"/>
-                <a:cs typeface="Courier New" panose="02070309020205020404" pitchFamily="49" charset="0"/>
-              </a:rPr>
-              <a:t>(10) </a:t>
-            </a:r>
-            <a:r>
-              <a:rPr lang="en-US" sz="1800" b="1" dirty="0">
-                <a:latin typeface="Courier New" panose="02070309020205020404" pitchFamily="49" charset="0"/>
-                <a:cs typeface="Courier New" panose="02070309020205020404" pitchFamily="49" charset="0"/>
-              </a:rPr>
-              <a:t>UNSIGNED NOT NULL,</a:t>
-            </a:r>
-            <a:endParaRPr lang="en-US" sz="1800" b="1" dirty="0" smtClean="0">
-              <a:latin typeface="Courier New" panose="02070309020205020404" pitchFamily="49" charset="0"/>
-              <a:cs typeface="Courier New" panose="02070309020205020404" pitchFamily="49" charset="0"/>
-            </a:endParaRPr>
-          </a:p>
-          <a:p>
-            <a:pPr marL="914400" lvl="2" indent="0">
-              <a:buClr>
-                <a:srgbClr val="002060"/>
-              </a:buClr>
-              <a:buNone/>
-            </a:pPr>
-            <a:r>
-              <a:rPr lang="en-US" sz="1800" b="1" dirty="0" smtClean="0">
-                <a:latin typeface="Courier New" panose="02070309020205020404" pitchFamily="49" charset="0"/>
-                <a:cs typeface="Courier New" panose="02070309020205020404" pitchFamily="49" charset="0"/>
-              </a:rPr>
-              <a:t>  PRIMARY </a:t>
-            </a:r>
-            <a:r>
-              <a:rPr lang="en-US" sz="1800" b="1" dirty="0" smtClean="0">
-                <a:latin typeface="Courier New" panose="02070309020205020404" pitchFamily="49" charset="0"/>
-                <a:cs typeface="Courier New" panose="02070309020205020404" pitchFamily="49" charset="0"/>
-              </a:rPr>
-              <a:t>KEY </a:t>
-            </a:r>
-            <a:r>
-              <a:rPr lang="en-US" sz="1800" dirty="0" smtClean="0">
-                <a:latin typeface="Courier New" panose="02070309020205020404" pitchFamily="49" charset="0"/>
-                <a:cs typeface="Courier New" panose="02070309020205020404" pitchFamily="49" charset="0"/>
-              </a:rPr>
-              <a:t>(</a:t>
-            </a:r>
-            <a:r>
-              <a:rPr lang="en-US" sz="1800" dirty="0" err="1" smtClean="0">
-                <a:latin typeface="Courier New" panose="02070309020205020404" pitchFamily="49" charset="0"/>
-                <a:cs typeface="Courier New" panose="02070309020205020404" pitchFamily="49" charset="0"/>
-              </a:rPr>
-              <a:t>replicon</a:t>
-            </a:r>
-            <a:r>
-              <a:rPr lang="en-US" sz="1800" dirty="0" err="1" smtClean="0">
-                <a:latin typeface="Courier New" panose="02070309020205020404" pitchFamily="49" charset="0"/>
-                <a:cs typeface="Courier New" panose="02070309020205020404" pitchFamily="49" charset="0"/>
-              </a:rPr>
-              <a:t>_id</a:t>
-            </a:r>
-            <a:r>
-              <a:rPr lang="en-US" sz="1800" dirty="0" smtClean="0">
-                <a:latin typeface="Courier New" panose="02070309020205020404" pitchFamily="49" charset="0"/>
-                <a:cs typeface="Courier New" panose="02070309020205020404" pitchFamily="49" charset="0"/>
-              </a:rPr>
-              <a:t>),</a:t>
-            </a:r>
-          </a:p>
-          <a:p>
-            <a:pPr marL="914400" lvl="2" indent="0">
-              <a:buClr>
-                <a:srgbClr val="002060"/>
-              </a:buClr>
-              <a:buNone/>
-            </a:pPr>
-            <a:r>
-              <a:rPr lang="en-US" sz="1800" dirty="0">
-                <a:latin typeface="Courier New" panose="02070309020205020404" pitchFamily="49" charset="0"/>
-                <a:cs typeface="Courier New" panose="02070309020205020404" pitchFamily="49" charset="0"/>
-              </a:rPr>
-              <a:t> </a:t>
-            </a:r>
-            <a:r>
-              <a:rPr lang="en-US" sz="1800" dirty="0" smtClean="0">
-                <a:latin typeface="Courier New" panose="02070309020205020404" pitchFamily="49" charset="0"/>
-                <a:cs typeface="Courier New" panose="02070309020205020404" pitchFamily="49" charset="0"/>
-              </a:rPr>
-              <a:t> </a:t>
-            </a:r>
-            <a:r>
               <a:rPr lang="en-US" sz="1800" b="1" dirty="0" smtClean="0">
                 <a:latin typeface="Courier New" panose="02070309020205020404" pitchFamily="49" charset="0"/>
                 <a:cs typeface="Courier New" panose="02070309020205020404" pitchFamily="49" charset="0"/>
@@ -20466,10 +20344,6 @@
               </a:rPr>
               <a:t>)</a:t>
             </a:r>
-            <a:endParaRPr lang="en-US" sz="1800" dirty="0" smtClean="0">
-              <a:latin typeface="Courier New" panose="02070309020205020404" pitchFamily="49" charset="0"/>
-              <a:cs typeface="Courier New" panose="02070309020205020404" pitchFamily="49" charset="0"/>
-            </a:endParaRPr>
           </a:p>
           <a:p>
             <a:pPr marL="463550" lvl="2" indent="0">
@@ -21151,11 +21025,7 @@
             </a:r>
             <a:r>
               <a:rPr lang="en-US" sz="2400" dirty="0" smtClean="0"/>
-              <a:t>se </a:t>
-            </a:r>
-            <a:r>
-              <a:rPr lang="en-US" sz="2400" dirty="0" smtClean="0"/>
-              <a:t>the </a:t>
+              <a:t>se the </a:t>
             </a:r>
             <a:r>
               <a:rPr lang="en-US" sz="2400" b="1" dirty="0" smtClean="0"/>
@@ -21214,7 +21084,6 @@
               <a:rPr lang="en-US" sz="2000" dirty="0" smtClean="0"/>
               <a:t>) </a:t>
             </a:r>
-            <a:endParaRPr lang="en-US" sz="2000" dirty="0" smtClean="0"/>
           </a:p>
           <a:p>
             <a:pPr marL="457200" lvl="1" indent="0">
@@ -21237,13 +21106,8 @@
             </a:r>
             <a:r>
               <a:rPr lang="en-US" sz="2000" dirty="0" smtClean="0"/>
-              <a:t> </a:t>
-            </a:r>
-            <a:r>
-              <a:rPr lang="en-US" sz="2000" dirty="0" smtClean="0"/>
-              <a:t>(1,1,‘E_coli_K12_MG1655_chr’, 4145, 4639675); </a:t>
-            </a:r>
-            <a:endParaRPr lang="en-US" sz="2000" dirty="0" smtClean="0"/>
+              <a:t> (1,1,‘E_coli_K12_MG1655_chr’, 4145, 4639675); </a:t>
+            </a:r>
           </a:p>
           <a:p>
             <a:pPr lvl="1">
@@ -21293,7 +21157,6 @@
               <a:rPr lang="en-US" sz="2000" dirty="0"/>
               <a:t>) </a:t>
             </a:r>
-            <a:endParaRPr lang="en-US" sz="2000" dirty="0"/>
           </a:p>
           <a:p>
             <a:pPr marL="457200" lvl="1" indent="0">
@@ -21468,7 +21331,6 @@
               <a:rPr lang="en-US" sz="2000" dirty="0" smtClean="0"/>
               <a:t>A_acidocaldarius_pB’, 92, 87298);</a:t>
             </a:r>
-            <a:endParaRPr lang="en-US" sz="2000" dirty="0" smtClean="0"/>
           </a:p>
           <a:p>
             <a:pPr lvl="1">
@@ -21518,7 +21380,6 @@
               <a:rPr lang="en-US" sz="2000" dirty="0"/>
               <a:t>) </a:t>
             </a:r>
-            <a:endParaRPr lang="en-US" sz="2000" dirty="0"/>
           </a:p>
           <a:p>
             <a:pPr marL="457200" lvl="1" indent="0">
@@ -22370,13 +22231,8 @@
             </a:r>
             <a:r>
               <a:rPr lang="en-US" sz="3200" dirty="0" smtClean="0"/>
-              <a:t>’, and then you just load the file into MySQL</a:t>
-            </a:r>
-            <a:r>
-              <a:rPr lang="en-US" sz="3200" dirty="0" smtClean="0"/>
-              <a:t>: </a:t>
-            </a:r>
-            <a:endParaRPr lang="en-US" sz="3200" dirty="0" smtClean="0"/>
+              <a:t>’, and then you just load the file into MySQL: </a:t>
+            </a:r>
           </a:p>
           <a:p>
             <a:pPr marL="862013" lvl="1" indent="-404813">
@@ -22777,22 +22633,7 @@
                   </a:outerShdw>
                 </a:effectLst>
               </a:rPr>
-              <a:t>Querying </a:t>
-            </a:r>
-            <a:r>
-              <a:rPr lang="en-US" b="1" dirty="0">
-                <a:solidFill>
-                  <a:srgbClr val="002060"/>
-                </a:solidFill>
-                <a:effectLst>
-                  <a:outerShdw blurRad="38100" dist="38100" dir="2700000" algn="tl">
-                    <a:srgbClr val="000000">
-                      <a:alpha val="43137"/>
-                    </a:srgbClr>
-                  </a:outerShdw>
-                </a:effectLst>
-              </a:rPr>
-              <a:t>S</a:t>
+              <a:t>Querying S</a:t>
             </a:r>
             <a:r>
               <a:rPr lang="en-US" b="1" dirty="0" smtClean="0">
@@ -22807,22 +22648,7 @@
                   </a:outerShdw>
                 </a:effectLst>
               </a:rPr>
-              <a:t>everal Ta</a:t>
-            </a:r>
-            <a:r>
-              <a:rPr lang="en-US" b="1" dirty="0" smtClean="0">
-                <a:solidFill>
-                  <a:srgbClr val="002060"/>
-                </a:solidFill>
-                <a:effectLst>
-                  <a:outerShdw blurRad="38100" dist="38100" dir="2700000" algn="tl">
-                    <a:srgbClr val="000000">
-                      <a:alpha val="43137"/>
-                    </a:srgbClr>
-                  </a:outerShdw>
-                </a:effectLst>
-              </a:rPr>
-              <a:t>bles</a:t>
+              <a:t>everal Tables</a:t>
             </a:r>
             <a:endParaRPr lang="en-US" b="1" dirty="0">
               <a:solidFill>
@@ -22870,13 +22696,8 @@
             </a:pPr>
             <a:r>
               <a:rPr lang="en-US" sz="2000" dirty="0" smtClean="0"/>
-              <a:t>Obtain the number of replicons for each genome</a:t>
-            </a:r>
-            <a:r>
-              <a:rPr lang="en-US" sz="2000" dirty="0" smtClean="0"/>
-              <a:t>: </a:t>
-            </a:r>
-            <a:endParaRPr lang="en-US" sz="2000" dirty="0" smtClean="0"/>
+              <a:t>Obtain the number of replicons for each genome: </a:t>
+            </a:r>
           </a:p>
           <a:p>
             <a:pPr marL="457200" lvl="1" indent="0">
@@ -22891,11 +22712,7 @@
             </a:r>
             <a:r>
               <a:rPr lang="en-US" sz="1800" dirty="0" smtClean="0"/>
-              <a:t> </a:t>
-            </a:r>
-            <a:r>
-              <a:rPr lang="en-US" sz="1800" dirty="0" smtClean="0"/>
-              <a:t>g.name, </a:t>
+              <a:t> g.name, </a:t>
             </a:r>
             <a:r>
               <a:rPr lang="en-US" sz="1800" dirty="0" err="1" smtClean="0"/>
@@ -22915,11 +22732,7 @@
             </a:r>
             <a:r>
               <a:rPr lang="en-US" sz="1800" dirty="0" err="1" smtClean="0"/>
-              <a:t>Num</a:t>
-            </a:r>
-            <a:r>
-              <a:rPr lang="en-US" sz="1800" dirty="0" err="1" smtClean="0"/>
-              <a:t>_replicons</a:t>
+              <a:t>Num_replicons</a:t>
             </a:r>
             <a:r>
               <a:rPr lang="en-US" sz="1800" dirty="0" smtClean="0"/>
@@ -22990,7 +22803,6 @@
               <a:rPr lang="en-US" sz="1800" dirty="0" smtClean="0"/>
               <a:t>;</a:t>
             </a:r>
-            <a:endParaRPr lang="en-US" sz="1800" dirty="0" smtClean="0"/>
           </a:p>
           <a:p>
             <a:pPr marL="457200" indent="-457200">
@@ -23002,13 +22814,8 @@
             </a:pPr>
             <a:r>
               <a:rPr lang="en-US" sz="2000" dirty="0" smtClean="0"/>
-              <a:t>Return the number of ORFs in each genome</a:t>
-            </a:r>
-            <a:r>
-              <a:rPr lang="en-US" sz="2000" dirty="0" smtClean="0"/>
-              <a:t>:  </a:t>
-            </a:r>
-            <a:endParaRPr lang="en-US" sz="2000" dirty="0" smtClean="0"/>
+              <a:t>Return the number of ORFs in each genome:  </a:t>
+            </a:r>
           </a:p>
           <a:p>
             <a:pPr marL="457200" lvl="1" indent="0">
@@ -23408,7 +23215,6 @@
               <a:rPr lang="en-US" sz="2000" dirty="0" smtClean="0"/>
               <a:t> </a:t>
             </a:r>
-            <a:endParaRPr lang="en-US" sz="2000" dirty="0" smtClean="0"/>
           </a:p>
         </p:txBody>
       </p:sp>
@@ -25645,7 +25451,6 @@
               <a:rPr lang="en-US" dirty="0" smtClean="0"/>
               <a:t>)</a:t>
             </a:r>
-            <a:endParaRPr lang="en-US" dirty="0" smtClean="0"/>
           </a:p>
           <a:p>
             <a:pPr marL="457200" indent="-457200">
@@ -25698,7 +25503,6 @@
               <a:rPr lang="en-US" dirty="0" smtClean="0"/>
               <a:t>Number of exons</a:t>
             </a:r>
-            <a:endParaRPr lang="en-US" dirty="0" smtClean="0"/>
           </a:p>
           <a:p>
             <a:pPr marL="457200" indent="-457200">
@@ -26184,7 +25988,6 @@
               <a:rPr lang="en-US" dirty="0" smtClean="0"/>
               <a:t>Synonym</a:t>
             </a:r>
-            <a:endParaRPr lang="en-US" dirty="0" smtClean="0"/>
           </a:p>
         </p:txBody>
       </p:sp>
@@ -26388,7 +26191,6 @@
               <a:rPr lang="en-US" dirty="0" smtClean="0"/>
               <a:t>External database</a:t>
             </a:r>
-            <a:endParaRPr lang="en-US" dirty="0" smtClean="0"/>
           </a:p>
           <a:p>
             <a:pPr marL="457200" indent="-457200">
@@ -26605,7 +26407,6 @@
               <a:rPr lang="en-US" dirty="0" smtClean="0"/>
               <a:t>Function</a:t>
             </a:r>
-            <a:endParaRPr lang="en-US" dirty="0" smtClean="0"/>
           </a:p>
         </p:txBody>
       </p:sp>
@@ -26806,11 +26607,7 @@
             </a:pPr>
             <a:r>
               <a:rPr lang="en-US" dirty="0" smtClean="0"/>
-              <a:t>Download</a:t>
-            </a:r>
-            <a:r>
-              <a:rPr lang="en-US" dirty="0" smtClean="0"/>
-              <a:t> the following 2 genomes from NCBI to fill your tables:</a:t>
+              <a:t>Download the following 2 genomes from NCBI to fill your tables:</a:t>
             </a:r>
           </a:p>
           <a:p>
@@ -26850,7 +26647,6 @@
               <a:rPr lang="en-US" sz="2200" dirty="0" smtClean="0"/>
               <a:t>:  1435057</a:t>
             </a:r>
-            <a:endParaRPr lang="en-US" sz="2200" dirty="0" smtClean="0"/>
           </a:p>
           <a:p>
             <a:pPr marL="914400" lvl="1" indent="-457200">
@@ -27084,7 +26880,6 @@
               <a:rPr lang="en-US" sz="2000" dirty="0" smtClean="0"/>
               <a:t>Keep practicing your queries.</a:t>
             </a:r>
-            <a:endParaRPr lang="en-US" sz="2000" dirty="0" smtClean="0"/>
           </a:p>
         </p:txBody>
       </p:sp>
@@ -28647,39 +28442,7 @@
             </a:pPr>
             <a:r>
               <a:rPr lang="en-US" sz="2200" dirty="0" smtClean="0"/>
-              <a:t>In this class we will </a:t>
-            </a:r>
-            <a:r>
-              <a:rPr lang="en-US" sz="2200" dirty="0" smtClean="0"/>
-              <a:t>see a crash course on MySQL and provide </a:t>
-            </a:r>
-            <a:r>
-              <a:rPr lang="en-US" sz="2200" dirty="0" smtClean="0"/>
-              <a:t>hands-on </a:t>
-            </a:r>
-            <a:r>
-              <a:rPr lang="en-US" sz="2200" dirty="0" smtClean="0"/>
-              <a:t>experience </a:t>
-            </a:r>
-            <a:r>
-              <a:rPr lang="en-US" sz="2200" dirty="0" smtClean="0"/>
-              <a:t>on</a:t>
-            </a:r>
-            <a:r>
-              <a:rPr lang="en-US" sz="2200" dirty="0" smtClean="0"/>
-              <a:t> the tools </a:t>
-            </a:r>
-            <a:r>
-              <a:rPr lang="en-US" sz="2200" dirty="0" smtClean="0"/>
-              <a:t>necessary to create, edit and query a database that is useful </a:t>
-            </a:r>
-            <a:r>
-              <a:rPr lang="en-US" sz="2200" dirty="0" smtClean="0"/>
-              <a:t>for bioinformatics. </a:t>
-            </a:r>
-            <a:r>
-              <a:rPr lang="en-US" sz="2200" dirty="0" smtClean="0"/>
-              <a:t>I trust this will be enough to give you a clear idea of the tremendous potential and benefits of Relational Database Management Systems.</a:t>
+              <a:t>In this class we will see a crash course on MySQL and provide hands-on experience on the tools necessary to create, edit and query a database that is useful for bioinformatics. I trust this will be enough to give you a clear idea of the tremendous potential and benefits of Relational Database Management Systems.</a:t>
             </a:r>
           </a:p>
           <a:p>
@@ -28696,11 +28459,7 @@
             </a:r>
             <a:r>
               <a:rPr lang="en-US" sz="2200" u="sng" dirty="0" smtClean="0"/>
-              <a:t>so much </a:t>
-            </a:r>
-            <a:r>
-              <a:rPr lang="en-US" sz="2200" u="sng" dirty="0" smtClean="0"/>
-              <a:t>more </a:t>
+              <a:t>so much more </a:t>
             </a:r>
             <a:r>
               <a:rPr lang="en-US" sz="2200" dirty="0" smtClean="0"/>

</xml_diff>